<commit_message>
bg music uninterrupted by scene change now
</commit_message>
<xml_diff>
--- a/_archive/tilemap.pptx
+++ b/_archive/tilemap.pptx
@@ -6,6 +6,7 @@
   </p:sldMasterIdLst>
   <p:sldIdLst>
     <p:sldId id="257" r:id="rId2"/>
+    <p:sldId id="258" r:id="rId3"/>
   </p:sldIdLst>
   <p:sldSz cx="12192000" cy="6858000"/>
   <p:notesSz cx="6858000" cy="9144000"/>
@@ -104,6 +105,11 @@
       </a:defRPr>
     </a:lvl9pPr>
   </p:defaultTextStyle>
+  <p:extLst>
+    <p:ext uri="{EFAFB233-063F-42B5-8137-9DF3F51BA10A}">
+      <p15:sldGuideLst xmlns:p15="http://schemas.microsoft.com/office/powerpoint/2012/main"/>
+    </p:ext>
+  </p:extLst>
 </p:presentation>
 </file>
 
@@ -3805,6 +3811,1007 @@
 </p:sld>
 </file>
 
+<file path=ppt/slides/slide2.xml><?xml version="1.0" encoding="utf-8"?>
+<p:sld xmlns:a="http://schemas.openxmlformats.org/drawingml/2006/main" xmlns:r="http://schemas.openxmlformats.org/officeDocument/2006/relationships" xmlns:p="http://schemas.openxmlformats.org/presentationml/2006/main">
+  <p:cSld>
+    <p:spTree>
+      <p:nvGrpSpPr>
+        <p:cNvPr id="1" name=""/>
+        <p:cNvGrpSpPr/>
+        <p:nvPr/>
+      </p:nvGrpSpPr>
+      <p:grpSpPr>
+        <a:xfrm>
+          <a:off x="0" y="0"/>
+          <a:ext cx="0" cy="0"/>
+          <a:chOff x="0" y="0"/>
+          <a:chExt cx="0" cy="0"/>
+        </a:xfrm>
+      </p:grpSpPr>
+      <p:pic>
+        <p:nvPicPr>
+          <p:cNvPr id="5" name="Picture 4" descr="A screenshot of a video game&#10;&#10;AI-generated content may be incorrect.">
+            <a:extLst>
+              <a:ext uri="{FF2B5EF4-FFF2-40B4-BE49-F238E27FC236}">
+                <a16:creationId xmlns:a16="http://schemas.microsoft.com/office/drawing/2014/main" id="{10BF1E7F-AAD5-989E-F807-63A9948DDC60}"/>
+              </a:ext>
+            </a:extLst>
+          </p:cNvPr>
+          <p:cNvPicPr>
+            <a:picLocks noChangeAspect="1"/>
+          </p:cNvPicPr>
+          <p:nvPr/>
+        </p:nvPicPr>
+        <p:blipFill>
+          <a:blip r:embed="rId2">
+            <a:extLst>
+              <a:ext uri="{BEBA8EAE-BF5A-486C-A8C5-ECC9F3942E4B}">
+                <a14:imgProps xmlns:a14="http://schemas.microsoft.com/office/drawing/2010/main">
+                  <a14:imgLayer r:embed="rId3">
+                    <a14:imgEffect>
+                      <a14:backgroundRemoval t="14041" b="81591" l="50644" r="82318">
+                        <a14:foregroundMark x1="54077" y1="14197" x2="54936" y2="47114"/>
+                        <a14:foregroundMark x1="54936" y1="69111" x2="53562" y2="77067"/>
+                        <a14:foregroundMark x1="53562" y1="77067" x2="53305" y2="77691"/>
+                        <a14:foregroundMark x1="51159" y1="78939" x2="57253" y2="78939"/>
+                        <a14:foregroundMark x1="50644" y1="73323" x2="53391" y2="60998"/>
+                        <a14:foregroundMark x1="57511" y1="74727" x2="55708" y2="58346"/>
+                        <a14:foregroundMark x1="57082" y1="80811" x2="57082" y2="80811"/>
+                        <a14:foregroundMark x1="52704" y1="80655" x2="52704" y2="80655"/>
+                        <a14:foregroundMark x1="52361" y1="79875" x2="53219" y2="79875"/>
+                        <a14:foregroundMark x1="52017" y1="81123" x2="52704" y2="81123"/>
+                        <a14:foregroundMark x1="54592" y1="79407" x2="57253" y2="79095"/>
+                        <a14:foregroundMark x1="52618" y1="56162" x2="52618" y2="56162"/>
+                        <a14:foregroundMark x1="56996" y1="56318" x2="56996" y2="56318"/>
+                        <a14:foregroundMark x1="57082" y1="53666" x2="57082" y2="53666"/>
+                        <a14:foregroundMark x1="52189" y1="53354" x2="52189" y2="53354"/>
+                        <a14:foregroundMark x1="54936" y1="53510" x2="54936" y2="56786"/>
+                        <a14:foregroundMark x1="52618" y1="57098" x2="54850" y2="57098"/>
+                        <a14:foregroundMark x1="56910" y1="56942" x2="56910" y2="56942"/>
+                        <a14:foregroundMark x1="55365" y1="57098" x2="55365" y2="57098"/>
+                        <a14:foregroundMark x1="52618" y1="52730" x2="51931" y2="44930"/>
+                        <a14:foregroundMark x1="51931" y1="44930" x2="55708" y2="37598"/>
+                        <a14:foregroundMark x1="55708" y1="37598" x2="58627" y2="42746"/>
+                        <a14:foregroundMark x1="58627" y1="42746" x2="58026" y2="51950"/>
+                        <a14:foregroundMark x1="58026" y1="51950" x2="52704" y2="50546"/>
+                        <a14:foregroundMark x1="52704" y1="50546" x2="51159" y2="42590"/>
+                        <a14:foregroundMark x1="51159" y1="42590" x2="55451" y2="42122"/>
+                        <a14:foregroundMark x1="55451" y1="42122" x2="53476" y2="48362"/>
+                        <a14:foregroundMark x1="50901" y1="58970" x2="50901" y2="64743"/>
+                        <a14:foregroundMark x1="51845" y1="29641" x2="52275" y2="21061"/>
+                        <a14:foregroundMark x1="52275" y1="21061" x2="55021" y2="15289"/>
+                        <a14:foregroundMark x1="55021" y1="15289" x2="57253" y2="22621"/>
+                        <a14:foregroundMark x1="57253" y1="22621" x2="57854" y2="30265"/>
+                        <a14:foregroundMark x1="57854" y1="30265" x2="55193" y2="24181"/>
+                        <a14:foregroundMark x1="58970" y1="28393" x2="58970" y2="28393"/>
+                        <a14:foregroundMark x1="58970" y1="28705" x2="58026" y2="26677"/>
+                        <a14:foregroundMark x1="58798" y1="30421" x2="57854" y2="24805"/>
+                        <a14:foregroundMark x1="58798" y1="26989" x2="57854" y2="24493"/>
+                        <a14:foregroundMark x1="51330" y1="34789" x2="51760" y2="30265"/>
+                        <a14:foregroundMark x1="50815" y1="30889" x2="50987" y2="30265"/>
+                        <a14:foregroundMark x1="50815" y1="29329" x2="51245" y2="28237"/>
+                        <a14:foregroundMark x1="50644" y1="27925" x2="51760" y2="25429"/>
+                        <a14:foregroundMark x1="51245" y1="22621" x2="51588" y2="20905"/>
+                        <a14:foregroundMark x1="54936" y1="14041" x2="54936" y2="18409"/>
+                        <a14:foregroundMark x1="55193" y1="21061" x2="53991" y2="31513"/>
+                        <a14:foregroundMark x1="53991" y1="31513" x2="56910" y2="28081"/>
+                        <a14:foregroundMark x1="52017" y1="32761" x2="56481" y2="33853"/>
+                        <a14:foregroundMark x1="56481" y1="33853" x2="52704" y2="31201"/>
+                        <a14:foregroundMark x1="52704" y1="31201" x2="56567" y2="33853"/>
+                        <a14:foregroundMark x1="56567" y1="33853" x2="52532" y2="53978"/>
+                        <a14:foregroundMark x1="52532" y1="53978" x2="52532" y2="53822"/>
+                        <a14:foregroundMark x1="51502" y1="60062" x2="55021" y2="63651"/>
+                        <a14:foregroundMark x1="55021" y1="63651" x2="53219" y2="72543"/>
+                        <a14:foregroundMark x1="53219" y1="72543" x2="51502" y2="59750"/>
+                        <a14:foregroundMark x1="51502" y1="59750" x2="52961" y2="72387"/>
+                        <a14:foregroundMark x1="54764" y1="80499" x2="54936" y2="81591"/>
+                        <a14:foregroundMark x1="50987" y1="77691" x2="56223" y2="77067"/>
+                        <a14:foregroundMark x1="56223" y1="77067" x2="58541" y2="69579"/>
+                        <a14:foregroundMark x1="58541" y1="69579" x2="58627" y2="63183"/>
+                        <a14:foregroundMark x1="50730" y1="73635" x2="51073" y2="59438"/>
+                        <a14:foregroundMark x1="57425" y1="31669" x2="58112" y2="35413"/>
+                        <a14:foregroundMark x1="58026" y1="22153" x2="58026" y2="21529"/>
+                        <a14:foregroundMark x1="57682" y1="22933" x2="58283" y2="27457"/>
+                        <a14:foregroundMark x1="52532" y1="18565" x2="51073" y2="21061"/>
+                        <a14:foregroundMark x1="57854" y1="20749" x2="57511" y2="20281"/>
+                        <a14:foregroundMark x1="56910" y1="19501" x2="58455" y2="23089"/>
+                        <a14:foregroundMark x1="55536" y1="28081" x2="57253" y2="53822"/>
+                        <a14:foregroundMark x1="57167" y1="56318" x2="57167" y2="56318"/>
+                        <a14:foregroundMark x1="56738" y1="56006" x2="57682" y2="58502"/>
+                        <a14:foregroundMark x1="56567" y1="56474" x2="57940" y2="64743"/>
+                        <a14:foregroundMark x1="54936" y1="80187" x2="54592" y2="81123"/>
+                      </a14:backgroundRemoval>
+                    </a14:imgEffect>
+                  </a14:imgLayer>
+                </a14:imgProps>
+              </a:ext>
+              <a:ext uri="{28A0092B-C50C-407E-A947-70E740481C1C}">
+                <a14:useLocalDpi xmlns:a14="http://schemas.microsoft.com/office/drawing/2010/main" val="0"/>
+              </a:ext>
+            </a:extLst>
+          </a:blip>
+          <a:srcRect l="50000" t="12209" r="40389" b="17185"/>
+          <a:stretch>
+            <a:fillRect/>
+          </a:stretch>
+        </p:blipFill>
+        <p:spPr>
+          <a:xfrm>
+            <a:off x="1861352" y="683580"/>
+            <a:ext cx="1137703" cy="4598633"/>
+          </a:xfrm>
+          <a:prstGeom prst="rect">
+            <a:avLst/>
+          </a:prstGeom>
+        </p:spPr>
+      </p:pic>
+      <p:sp>
+        <p:nvSpPr>
+          <p:cNvPr id="6" name="TextBox 5">
+            <a:extLst>
+              <a:ext uri="{FF2B5EF4-FFF2-40B4-BE49-F238E27FC236}">
+                <a16:creationId xmlns:a16="http://schemas.microsoft.com/office/drawing/2014/main" id="{8C967340-4BE4-F682-D2B4-E675C0A12A56}"/>
+              </a:ext>
+            </a:extLst>
+          </p:cNvPr>
+          <p:cNvSpPr txBox="1"/>
+          <p:nvPr/>
+        </p:nvSpPr>
+        <p:spPr>
+          <a:xfrm>
+            <a:off x="1986319" y="1819917"/>
+            <a:ext cx="887767" cy="1862048"/>
+          </a:xfrm>
+          <a:prstGeom prst="rect">
+            <a:avLst/>
+          </a:prstGeom>
+          <a:noFill/>
+        </p:spPr>
+        <p:txBody>
+          <a:bodyPr wrap="square" rtlCol="0">
+            <a:spAutoFit/>
+          </a:bodyPr>
+          <a:lstStyle/>
+          <a:p>
+            <a:pPr algn="ctr"/>
+            <a:r>
+              <a:rPr lang="en-GB" sz="11500" b="1" dirty="0">
+                <a:solidFill>
+                  <a:schemeClr val="bg1"/>
+                </a:solidFill>
+              </a:rPr>
+              <a:t>1</a:t>
+            </a:r>
+          </a:p>
+        </p:txBody>
+      </p:sp>
+      <p:pic>
+        <p:nvPicPr>
+          <p:cNvPr id="7" name="Picture 6" descr="A screenshot of a video game&#10;&#10;AI-generated content may be incorrect.">
+            <a:extLst>
+              <a:ext uri="{FF2B5EF4-FFF2-40B4-BE49-F238E27FC236}">
+                <a16:creationId xmlns:a16="http://schemas.microsoft.com/office/drawing/2014/main" id="{F7DFCD6D-A4D5-0857-71A9-8D0D1E5BE1E5}"/>
+              </a:ext>
+            </a:extLst>
+          </p:cNvPr>
+          <p:cNvPicPr>
+            <a:picLocks noChangeAspect="1"/>
+          </p:cNvPicPr>
+          <p:nvPr/>
+        </p:nvPicPr>
+        <p:blipFill>
+          <a:blip r:embed="rId2">
+            <a:grayscl/>
+            <a:extLst>
+              <a:ext uri="{BEBA8EAE-BF5A-486C-A8C5-ECC9F3942E4B}">
+                <a14:imgProps xmlns:a14="http://schemas.microsoft.com/office/drawing/2010/main">
+                  <a14:imgLayer r:embed="rId3">
+                    <a14:imgEffect>
+                      <a14:backgroundRemoval t="14041" b="81591" l="50644" r="82318">
+                        <a14:foregroundMark x1="54077" y1="14197" x2="54936" y2="47114"/>
+                        <a14:foregroundMark x1="54936" y1="69111" x2="53562" y2="77067"/>
+                        <a14:foregroundMark x1="53562" y1="77067" x2="53305" y2="77691"/>
+                        <a14:foregroundMark x1="51159" y1="78939" x2="57253" y2="78939"/>
+                        <a14:foregroundMark x1="50644" y1="73323" x2="53391" y2="60998"/>
+                        <a14:foregroundMark x1="57511" y1="74727" x2="55708" y2="58346"/>
+                        <a14:foregroundMark x1="57082" y1="80811" x2="57082" y2="80811"/>
+                        <a14:foregroundMark x1="52704" y1="80655" x2="52704" y2="80655"/>
+                        <a14:foregroundMark x1="52361" y1="79875" x2="53219" y2="79875"/>
+                        <a14:foregroundMark x1="52017" y1="81123" x2="52704" y2="81123"/>
+                        <a14:foregroundMark x1="54592" y1="79407" x2="57253" y2="79095"/>
+                        <a14:foregroundMark x1="52618" y1="56162" x2="52618" y2="56162"/>
+                        <a14:foregroundMark x1="56996" y1="56318" x2="56996" y2="56318"/>
+                        <a14:foregroundMark x1="57082" y1="53666" x2="57082" y2="53666"/>
+                        <a14:foregroundMark x1="52189" y1="53354" x2="52189" y2="53354"/>
+                        <a14:foregroundMark x1="54936" y1="53510" x2="54936" y2="56786"/>
+                        <a14:foregroundMark x1="52618" y1="57098" x2="54850" y2="57098"/>
+                        <a14:foregroundMark x1="56910" y1="56942" x2="56910" y2="56942"/>
+                        <a14:foregroundMark x1="55365" y1="57098" x2="55365" y2="57098"/>
+                        <a14:foregroundMark x1="52618" y1="52730" x2="51931" y2="44930"/>
+                        <a14:foregroundMark x1="51931" y1="44930" x2="55708" y2="37598"/>
+                        <a14:foregroundMark x1="55708" y1="37598" x2="58627" y2="42746"/>
+                        <a14:foregroundMark x1="58627" y1="42746" x2="58026" y2="51950"/>
+                        <a14:foregroundMark x1="58026" y1="51950" x2="52704" y2="50546"/>
+                        <a14:foregroundMark x1="52704" y1="50546" x2="51159" y2="42590"/>
+                        <a14:foregroundMark x1="51159" y1="42590" x2="55451" y2="42122"/>
+                        <a14:foregroundMark x1="55451" y1="42122" x2="53476" y2="48362"/>
+                        <a14:foregroundMark x1="50901" y1="58970" x2="50901" y2="64743"/>
+                        <a14:foregroundMark x1="51845" y1="29641" x2="52275" y2="21061"/>
+                        <a14:foregroundMark x1="52275" y1="21061" x2="55021" y2="15289"/>
+                        <a14:foregroundMark x1="55021" y1="15289" x2="57253" y2="22621"/>
+                        <a14:foregroundMark x1="57253" y1="22621" x2="57854" y2="30265"/>
+                        <a14:foregroundMark x1="57854" y1="30265" x2="55193" y2="24181"/>
+                        <a14:foregroundMark x1="58970" y1="28393" x2="58970" y2="28393"/>
+                        <a14:foregroundMark x1="58970" y1="28705" x2="58026" y2="26677"/>
+                        <a14:foregroundMark x1="58798" y1="30421" x2="57854" y2="24805"/>
+                        <a14:foregroundMark x1="58798" y1="26989" x2="57854" y2="24493"/>
+                        <a14:foregroundMark x1="51330" y1="34789" x2="51760" y2="30265"/>
+                        <a14:foregroundMark x1="50815" y1="30889" x2="50987" y2="30265"/>
+                        <a14:foregroundMark x1="50815" y1="29329" x2="51245" y2="28237"/>
+                        <a14:foregroundMark x1="50644" y1="27925" x2="51760" y2="25429"/>
+                        <a14:foregroundMark x1="51245" y1="22621" x2="51588" y2="20905"/>
+                        <a14:foregroundMark x1="54936" y1="14041" x2="54936" y2="18409"/>
+                        <a14:foregroundMark x1="55193" y1="21061" x2="53991" y2="31513"/>
+                        <a14:foregroundMark x1="53991" y1="31513" x2="56910" y2="28081"/>
+                        <a14:foregroundMark x1="52017" y1="32761" x2="56481" y2="33853"/>
+                        <a14:foregroundMark x1="56481" y1="33853" x2="52704" y2="31201"/>
+                        <a14:foregroundMark x1="52704" y1="31201" x2="56567" y2="33853"/>
+                        <a14:foregroundMark x1="56567" y1="33853" x2="52532" y2="53978"/>
+                        <a14:foregroundMark x1="52532" y1="53978" x2="52532" y2="53822"/>
+                        <a14:foregroundMark x1="51502" y1="60062" x2="55021" y2="63651"/>
+                        <a14:foregroundMark x1="55021" y1="63651" x2="53219" y2="72543"/>
+                        <a14:foregroundMark x1="53219" y1="72543" x2="51502" y2="59750"/>
+                        <a14:foregroundMark x1="51502" y1="59750" x2="52961" y2="72387"/>
+                        <a14:foregroundMark x1="54764" y1="80499" x2="54936" y2="81591"/>
+                        <a14:foregroundMark x1="50987" y1="77691" x2="56223" y2="77067"/>
+                        <a14:foregroundMark x1="56223" y1="77067" x2="58541" y2="69579"/>
+                        <a14:foregroundMark x1="58541" y1="69579" x2="58627" y2="63183"/>
+                        <a14:foregroundMark x1="50730" y1="73635" x2="51073" y2="59438"/>
+                        <a14:foregroundMark x1="57425" y1="31669" x2="58112" y2="35413"/>
+                        <a14:foregroundMark x1="58026" y1="22153" x2="58026" y2="21529"/>
+                        <a14:foregroundMark x1="57682" y1="22933" x2="58283" y2="27457"/>
+                        <a14:foregroundMark x1="52532" y1="18565" x2="51073" y2="21061"/>
+                        <a14:foregroundMark x1="57854" y1="20749" x2="57511" y2="20281"/>
+                        <a14:foregroundMark x1="56910" y1="19501" x2="58455" y2="23089"/>
+                        <a14:foregroundMark x1="55536" y1="28081" x2="57253" y2="53822"/>
+                        <a14:foregroundMark x1="57167" y1="56318" x2="57167" y2="56318"/>
+                        <a14:foregroundMark x1="56738" y1="56006" x2="57682" y2="58502"/>
+                        <a14:foregroundMark x1="56567" y1="56474" x2="57940" y2="64743"/>
+                        <a14:foregroundMark x1="54936" y1="80187" x2="54592" y2="81123"/>
+                      </a14:backgroundRemoval>
+                    </a14:imgEffect>
+                  </a14:imgLayer>
+                </a14:imgProps>
+              </a:ext>
+              <a:ext uri="{28A0092B-C50C-407E-A947-70E740481C1C}">
+                <a14:useLocalDpi xmlns:a14="http://schemas.microsoft.com/office/drawing/2010/main" val="0"/>
+              </a:ext>
+            </a:extLst>
+          </a:blip>
+          <a:srcRect l="50000" t="12209" r="40389" b="17185"/>
+          <a:stretch>
+            <a:fillRect/>
+          </a:stretch>
+        </p:blipFill>
+        <p:spPr>
+          <a:xfrm>
+            <a:off x="3354280" y="683580"/>
+            <a:ext cx="1137703" cy="4598633"/>
+          </a:xfrm>
+          <a:prstGeom prst="rect">
+            <a:avLst/>
+          </a:prstGeom>
+        </p:spPr>
+      </p:pic>
+      <p:sp>
+        <p:nvSpPr>
+          <p:cNvPr id="8" name="TextBox 7">
+            <a:extLst>
+              <a:ext uri="{FF2B5EF4-FFF2-40B4-BE49-F238E27FC236}">
+                <a16:creationId xmlns:a16="http://schemas.microsoft.com/office/drawing/2014/main" id="{CC4E5E8C-B22A-AB14-44DD-52C8BE517B46}"/>
+              </a:ext>
+            </a:extLst>
+          </p:cNvPr>
+          <p:cNvSpPr txBox="1"/>
+          <p:nvPr/>
+        </p:nvSpPr>
+        <p:spPr>
+          <a:xfrm>
+            <a:off x="3479247" y="1819917"/>
+            <a:ext cx="887767" cy="1862048"/>
+          </a:xfrm>
+          <a:prstGeom prst="rect">
+            <a:avLst/>
+          </a:prstGeom>
+          <a:noFill/>
+        </p:spPr>
+        <p:txBody>
+          <a:bodyPr wrap="square" rtlCol="0">
+            <a:spAutoFit/>
+          </a:bodyPr>
+          <a:lstStyle/>
+          <a:p>
+            <a:pPr algn="ctr"/>
+            <a:r>
+              <a:rPr lang="en-GB" sz="11500" b="1" dirty="0">
+                <a:solidFill>
+                  <a:schemeClr val="bg1"/>
+                </a:solidFill>
+              </a:rPr>
+              <a:t>2</a:t>
+            </a:r>
+          </a:p>
+        </p:txBody>
+      </p:sp>
+      <p:pic>
+        <p:nvPicPr>
+          <p:cNvPr id="9" name="Picture 8" descr="A screenshot of a video game&#10;&#10;AI-generated content may be incorrect.">
+            <a:extLst>
+              <a:ext uri="{FF2B5EF4-FFF2-40B4-BE49-F238E27FC236}">
+                <a16:creationId xmlns:a16="http://schemas.microsoft.com/office/drawing/2014/main" id="{BA3B8E14-95C7-99A1-374A-E4FEA5B82808}"/>
+              </a:ext>
+            </a:extLst>
+          </p:cNvPr>
+          <p:cNvPicPr>
+            <a:picLocks noChangeAspect="1"/>
+          </p:cNvPicPr>
+          <p:nvPr/>
+        </p:nvPicPr>
+        <p:blipFill>
+          <a:blip r:embed="rId2">
+            <a:duotone>
+              <a:schemeClr val="accent2">
+                <a:shade val="45000"/>
+                <a:satMod val="135000"/>
+              </a:schemeClr>
+              <a:prstClr val="white"/>
+            </a:duotone>
+            <a:extLst>
+              <a:ext uri="{BEBA8EAE-BF5A-486C-A8C5-ECC9F3942E4B}">
+                <a14:imgProps xmlns:a14="http://schemas.microsoft.com/office/drawing/2010/main">
+                  <a14:imgLayer r:embed="rId3">
+                    <a14:imgEffect>
+                      <a14:backgroundRemoval t="14041" b="81591" l="50644" r="82318">
+                        <a14:foregroundMark x1="54077" y1="14197" x2="54936" y2="47114"/>
+                        <a14:foregroundMark x1="54936" y1="69111" x2="53562" y2="77067"/>
+                        <a14:foregroundMark x1="53562" y1="77067" x2="53305" y2="77691"/>
+                        <a14:foregroundMark x1="51159" y1="78939" x2="57253" y2="78939"/>
+                        <a14:foregroundMark x1="50644" y1="73323" x2="53391" y2="60998"/>
+                        <a14:foregroundMark x1="57511" y1="74727" x2="55708" y2="58346"/>
+                        <a14:foregroundMark x1="57082" y1="80811" x2="57082" y2="80811"/>
+                        <a14:foregroundMark x1="52704" y1="80655" x2="52704" y2="80655"/>
+                        <a14:foregroundMark x1="52361" y1="79875" x2="53219" y2="79875"/>
+                        <a14:foregroundMark x1="52017" y1="81123" x2="52704" y2="81123"/>
+                        <a14:foregroundMark x1="54592" y1="79407" x2="57253" y2="79095"/>
+                        <a14:foregroundMark x1="52618" y1="56162" x2="52618" y2="56162"/>
+                        <a14:foregroundMark x1="56996" y1="56318" x2="56996" y2="56318"/>
+                        <a14:foregroundMark x1="57082" y1="53666" x2="57082" y2="53666"/>
+                        <a14:foregroundMark x1="52189" y1="53354" x2="52189" y2="53354"/>
+                        <a14:foregroundMark x1="54936" y1="53510" x2="54936" y2="56786"/>
+                        <a14:foregroundMark x1="52618" y1="57098" x2="54850" y2="57098"/>
+                        <a14:foregroundMark x1="56910" y1="56942" x2="56910" y2="56942"/>
+                        <a14:foregroundMark x1="55365" y1="57098" x2="55365" y2="57098"/>
+                        <a14:foregroundMark x1="52618" y1="52730" x2="51931" y2="44930"/>
+                        <a14:foregroundMark x1="51931" y1="44930" x2="55708" y2="37598"/>
+                        <a14:foregroundMark x1="55708" y1="37598" x2="58627" y2="42746"/>
+                        <a14:foregroundMark x1="58627" y1="42746" x2="58026" y2="51950"/>
+                        <a14:foregroundMark x1="58026" y1="51950" x2="52704" y2="50546"/>
+                        <a14:foregroundMark x1="52704" y1="50546" x2="51159" y2="42590"/>
+                        <a14:foregroundMark x1="51159" y1="42590" x2="55451" y2="42122"/>
+                        <a14:foregroundMark x1="55451" y1="42122" x2="53476" y2="48362"/>
+                        <a14:foregroundMark x1="50901" y1="58970" x2="50901" y2="64743"/>
+                        <a14:foregroundMark x1="51845" y1="29641" x2="52275" y2="21061"/>
+                        <a14:foregroundMark x1="52275" y1="21061" x2="55021" y2="15289"/>
+                        <a14:foregroundMark x1="55021" y1="15289" x2="57253" y2="22621"/>
+                        <a14:foregroundMark x1="57253" y1="22621" x2="57854" y2="30265"/>
+                        <a14:foregroundMark x1="57854" y1="30265" x2="55193" y2="24181"/>
+                        <a14:foregroundMark x1="58970" y1="28393" x2="58970" y2="28393"/>
+                        <a14:foregroundMark x1="58970" y1="28705" x2="58026" y2="26677"/>
+                        <a14:foregroundMark x1="58798" y1="30421" x2="57854" y2="24805"/>
+                        <a14:foregroundMark x1="58798" y1="26989" x2="57854" y2="24493"/>
+                        <a14:foregroundMark x1="51330" y1="34789" x2="51760" y2="30265"/>
+                        <a14:foregroundMark x1="50815" y1="30889" x2="50987" y2="30265"/>
+                        <a14:foregroundMark x1="50815" y1="29329" x2="51245" y2="28237"/>
+                        <a14:foregroundMark x1="50644" y1="27925" x2="51760" y2="25429"/>
+                        <a14:foregroundMark x1="51245" y1="22621" x2="51588" y2="20905"/>
+                        <a14:foregroundMark x1="54936" y1="14041" x2="54936" y2="18409"/>
+                        <a14:foregroundMark x1="55193" y1="21061" x2="53991" y2="31513"/>
+                        <a14:foregroundMark x1="53991" y1="31513" x2="56910" y2="28081"/>
+                        <a14:foregroundMark x1="52017" y1="32761" x2="56481" y2="33853"/>
+                        <a14:foregroundMark x1="56481" y1="33853" x2="52704" y2="31201"/>
+                        <a14:foregroundMark x1="52704" y1="31201" x2="56567" y2="33853"/>
+                        <a14:foregroundMark x1="56567" y1="33853" x2="52532" y2="53978"/>
+                        <a14:foregroundMark x1="52532" y1="53978" x2="52532" y2="53822"/>
+                        <a14:foregroundMark x1="51502" y1="60062" x2="55021" y2="63651"/>
+                        <a14:foregroundMark x1="55021" y1="63651" x2="53219" y2="72543"/>
+                        <a14:foregroundMark x1="53219" y1="72543" x2="51502" y2="59750"/>
+                        <a14:foregroundMark x1="51502" y1="59750" x2="52961" y2="72387"/>
+                        <a14:foregroundMark x1="54764" y1="80499" x2="54936" y2="81591"/>
+                        <a14:foregroundMark x1="50987" y1="77691" x2="56223" y2="77067"/>
+                        <a14:foregroundMark x1="56223" y1="77067" x2="58541" y2="69579"/>
+                        <a14:foregroundMark x1="58541" y1="69579" x2="58627" y2="63183"/>
+                        <a14:foregroundMark x1="50730" y1="73635" x2="51073" y2="59438"/>
+                        <a14:foregroundMark x1="57425" y1="31669" x2="58112" y2="35413"/>
+                        <a14:foregroundMark x1="58026" y1="22153" x2="58026" y2="21529"/>
+                        <a14:foregroundMark x1="57682" y1="22933" x2="58283" y2="27457"/>
+                        <a14:foregroundMark x1="52532" y1="18565" x2="51073" y2="21061"/>
+                        <a14:foregroundMark x1="57854" y1="20749" x2="57511" y2="20281"/>
+                        <a14:foregroundMark x1="56910" y1="19501" x2="58455" y2="23089"/>
+                        <a14:foregroundMark x1="55536" y1="28081" x2="57253" y2="53822"/>
+                        <a14:foregroundMark x1="57167" y1="56318" x2="57167" y2="56318"/>
+                        <a14:foregroundMark x1="56738" y1="56006" x2="57682" y2="58502"/>
+                        <a14:foregroundMark x1="56567" y1="56474" x2="57940" y2="64743"/>
+                        <a14:foregroundMark x1="54936" y1="80187" x2="54592" y2="81123"/>
+                      </a14:backgroundRemoval>
+                    </a14:imgEffect>
+                  </a14:imgLayer>
+                </a14:imgProps>
+              </a:ext>
+              <a:ext uri="{28A0092B-C50C-407E-A947-70E740481C1C}">
+                <a14:useLocalDpi xmlns:a14="http://schemas.microsoft.com/office/drawing/2010/main" val="0"/>
+              </a:ext>
+            </a:extLst>
+          </a:blip>
+          <a:srcRect l="50000" t="12209" r="40389" b="17185"/>
+          <a:stretch>
+            <a:fillRect/>
+          </a:stretch>
+        </p:blipFill>
+        <p:spPr>
+          <a:xfrm>
+            <a:off x="4847208" y="683580"/>
+            <a:ext cx="1137703" cy="4598633"/>
+          </a:xfrm>
+          <a:prstGeom prst="rect">
+            <a:avLst/>
+          </a:prstGeom>
+        </p:spPr>
+      </p:pic>
+      <p:sp>
+        <p:nvSpPr>
+          <p:cNvPr id="10" name="TextBox 9">
+            <a:extLst>
+              <a:ext uri="{FF2B5EF4-FFF2-40B4-BE49-F238E27FC236}">
+                <a16:creationId xmlns:a16="http://schemas.microsoft.com/office/drawing/2014/main" id="{212A4C6A-B507-BEFB-C3DD-D3AF5B740D27}"/>
+              </a:ext>
+            </a:extLst>
+          </p:cNvPr>
+          <p:cNvSpPr txBox="1"/>
+          <p:nvPr/>
+        </p:nvSpPr>
+        <p:spPr>
+          <a:xfrm>
+            <a:off x="4972175" y="1819917"/>
+            <a:ext cx="887767" cy="1862048"/>
+          </a:xfrm>
+          <a:prstGeom prst="rect">
+            <a:avLst/>
+          </a:prstGeom>
+          <a:noFill/>
+        </p:spPr>
+        <p:txBody>
+          <a:bodyPr wrap="square" rtlCol="0">
+            <a:spAutoFit/>
+          </a:bodyPr>
+          <a:lstStyle/>
+          <a:p>
+            <a:pPr algn="ctr"/>
+            <a:r>
+              <a:rPr lang="en-GB" sz="11500" b="1" dirty="0">
+                <a:solidFill>
+                  <a:schemeClr val="bg1"/>
+                </a:solidFill>
+              </a:rPr>
+              <a:t>3</a:t>
+            </a:r>
+          </a:p>
+        </p:txBody>
+      </p:sp>
+      <p:pic>
+        <p:nvPicPr>
+          <p:cNvPr id="11" name="Picture 10" descr="A screenshot of a video game&#10;&#10;AI-generated content may be incorrect.">
+            <a:extLst>
+              <a:ext uri="{FF2B5EF4-FFF2-40B4-BE49-F238E27FC236}">
+                <a16:creationId xmlns:a16="http://schemas.microsoft.com/office/drawing/2014/main" id="{6E1E043F-833A-C246-62D4-8D317DC4EF11}"/>
+              </a:ext>
+            </a:extLst>
+          </p:cNvPr>
+          <p:cNvPicPr>
+            <a:picLocks noChangeAspect="1"/>
+          </p:cNvPicPr>
+          <p:nvPr/>
+        </p:nvPicPr>
+        <p:blipFill>
+          <a:blip r:embed="rId2">
+            <a:duotone>
+              <a:schemeClr val="accent3">
+                <a:shade val="45000"/>
+                <a:satMod val="135000"/>
+              </a:schemeClr>
+              <a:prstClr val="white"/>
+            </a:duotone>
+            <a:extLst>
+              <a:ext uri="{BEBA8EAE-BF5A-486C-A8C5-ECC9F3942E4B}">
+                <a14:imgProps xmlns:a14="http://schemas.microsoft.com/office/drawing/2010/main">
+                  <a14:imgLayer r:embed="rId3">
+                    <a14:imgEffect>
+                      <a14:backgroundRemoval t="14041" b="81591" l="50644" r="82318">
+                        <a14:foregroundMark x1="54077" y1="14197" x2="54936" y2="47114"/>
+                        <a14:foregroundMark x1="54936" y1="69111" x2="53562" y2="77067"/>
+                        <a14:foregroundMark x1="53562" y1="77067" x2="53305" y2="77691"/>
+                        <a14:foregroundMark x1="51159" y1="78939" x2="57253" y2="78939"/>
+                        <a14:foregroundMark x1="50644" y1="73323" x2="53391" y2="60998"/>
+                        <a14:foregroundMark x1="57511" y1="74727" x2="55708" y2="58346"/>
+                        <a14:foregroundMark x1="57082" y1="80811" x2="57082" y2="80811"/>
+                        <a14:foregroundMark x1="52704" y1="80655" x2="52704" y2="80655"/>
+                        <a14:foregroundMark x1="52361" y1="79875" x2="53219" y2="79875"/>
+                        <a14:foregroundMark x1="52017" y1="81123" x2="52704" y2="81123"/>
+                        <a14:foregroundMark x1="54592" y1="79407" x2="57253" y2="79095"/>
+                        <a14:foregroundMark x1="52618" y1="56162" x2="52618" y2="56162"/>
+                        <a14:foregroundMark x1="56996" y1="56318" x2="56996" y2="56318"/>
+                        <a14:foregroundMark x1="57082" y1="53666" x2="57082" y2="53666"/>
+                        <a14:foregroundMark x1="52189" y1="53354" x2="52189" y2="53354"/>
+                        <a14:foregroundMark x1="54936" y1="53510" x2="54936" y2="56786"/>
+                        <a14:foregroundMark x1="52618" y1="57098" x2="54850" y2="57098"/>
+                        <a14:foregroundMark x1="56910" y1="56942" x2="56910" y2="56942"/>
+                        <a14:foregroundMark x1="55365" y1="57098" x2="55365" y2="57098"/>
+                        <a14:foregroundMark x1="52618" y1="52730" x2="51931" y2="44930"/>
+                        <a14:foregroundMark x1="51931" y1="44930" x2="55708" y2="37598"/>
+                        <a14:foregroundMark x1="55708" y1="37598" x2="58627" y2="42746"/>
+                        <a14:foregroundMark x1="58627" y1="42746" x2="58026" y2="51950"/>
+                        <a14:foregroundMark x1="58026" y1="51950" x2="52704" y2="50546"/>
+                        <a14:foregroundMark x1="52704" y1="50546" x2="51159" y2="42590"/>
+                        <a14:foregroundMark x1="51159" y1="42590" x2="55451" y2="42122"/>
+                        <a14:foregroundMark x1="55451" y1="42122" x2="53476" y2="48362"/>
+                        <a14:foregroundMark x1="50901" y1="58970" x2="50901" y2="64743"/>
+                        <a14:foregroundMark x1="51845" y1="29641" x2="52275" y2="21061"/>
+                        <a14:foregroundMark x1="52275" y1="21061" x2="55021" y2="15289"/>
+                        <a14:foregroundMark x1="55021" y1="15289" x2="57253" y2="22621"/>
+                        <a14:foregroundMark x1="57253" y1="22621" x2="57854" y2="30265"/>
+                        <a14:foregroundMark x1="57854" y1="30265" x2="55193" y2="24181"/>
+                        <a14:foregroundMark x1="58970" y1="28393" x2="58970" y2="28393"/>
+                        <a14:foregroundMark x1="58970" y1="28705" x2="58026" y2="26677"/>
+                        <a14:foregroundMark x1="58798" y1="30421" x2="57854" y2="24805"/>
+                        <a14:foregroundMark x1="58798" y1="26989" x2="57854" y2="24493"/>
+                        <a14:foregroundMark x1="51330" y1="34789" x2="51760" y2="30265"/>
+                        <a14:foregroundMark x1="50815" y1="30889" x2="50987" y2="30265"/>
+                        <a14:foregroundMark x1="50815" y1="29329" x2="51245" y2="28237"/>
+                        <a14:foregroundMark x1="50644" y1="27925" x2="51760" y2="25429"/>
+                        <a14:foregroundMark x1="51245" y1="22621" x2="51588" y2="20905"/>
+                        <a14:foregroundMark x1="54936" y1="14041" x2="54936" y2="18409"/>
+                        <a14:foregroundMark x1="55193" y1="21061" x2="53991" y2="31513"/>
+                        <a14:foregroundMark x1="53991" y1="31513" x2="56910" y2="28081"/>
+                        <a14:foregroundMark x1="52017" y1="32761" x2="56481" y2="33853"/>
+                        <a14:foregroundMark x1="56481" y1="33853" x2="52704" y2="31201"/>
+                        <a14:foregroundMark x1="52704" y1="31201" x2="56567" y2="33853"/>
+                        <a14:foregroundMark x1="56567" y1="33853" x2="52532" y2="53978"/>
+                        <a14:foregroundMark x1="52532" y1="53978" x2="52532" y2="53822"/>
+                        <a14:foregroundMark x1="51502" y1="60062" x2="55021" y2="63651"/>
+                        <a14:foregroundMark x1="55021" y1="63651" x2="53219" y2="72543"/>
+                        <a14:foregroundMark x1="53219" y1="72543" x2="51502" y2="59750"/>
+                        <a14:foregroundMark x1="51502" y1="59750" x2="52961" y2="72387"/>
+                        <a14:foregroundMark x1="54764" y1="80499" x2="54936" y2="81591"/>
+                        <a14:foregroundMark x1="50987" y1="77691" x2="56223" y2="77067"/>
+                        <a14:foregroundMark x1="56223" y1="77067" x2="58541" y2="69579"/>
+                        <a14:foregroundMark x1="58541" y1="69579" x2="58627" y2="63183"/>
+                        <a14:foregroundMark x1="50730" y1="73635" x2="51073" y2="59438"/>
+                        <a14:foregroundMark x1="57425" y1="31669" x2="58112" y2="35413"/>
+                        <a14:foregroundMark x1="58026" y1="22153" x2="58026" y2="21529"/>
+                        <a14:foregroundMark x1="57682" y1="22933" x2="58283" y2="27457"/>
+                        <a14:foregroundMark x1="52532" y1="18565" x2="51073" y2="21061"/>
+                        <a14:foregroundMark x1="57854" y1="20749" x2="57511" y2="20281"/>
+                        <a14:foregroundMark x1="56910" y1="19501" x2="58455" y2="23089"/>
+                        <a14:foregroundMark x1="55536" y1="28081" x2="57253" y2="53822"/>
+                        <a14:foregroundMark x1="57167" y1="56318" x2="57167" y2="56318"/>
+                        <a14:foregroundMark x1="56738" y1="56006" x2="57682" y2="58502"/>
+                        <a14:foregroundMark x1="56567" y1="56474" x2="57940" y2="64743"/>
+                        <a14:foregroundMark x1="54936" y1="80187" x2="54592" y2="81123"/>
+                      </a14:backgroundRemoval>
+                    </a14:imgEffect>
+                  </a14:imgLayer>
+                </a14:imgProps>
+              </a:ext>
+              <a:ext uri="{28A0092B-C50C-407E-A947-70E740481C1C}">
+                <a14:useLocalDpi xmlns:a14="http://schemas.microsoft.com/office/drawing/2010/main" val="0"/>
+              </a:ext>
+            </a:extLst>
+          </a:blip>
+          <a:srcRect l="50000" t="12209" r="40389" b="17185"/>
+          <a:stretch>
+            <a:fillRect/>
+          </a:stretch>
+        </p:blipFill>
+        <p:spPr>
+          <a:xfrm>
+            <a:off x="6340136" y="683580"/>
+            <a:ext cx="1137703" cy="4598633"/>
+          </a:xfrm>
+          <a:prstGeom prst="rect">
+            <a:avLst/>
+          </a:prstGeom>
+        </p:spPr>
+      </p:pic>
+      <p:sp>
+        <p:nvSpPr>
+          <p:cNvPr id="12" name="TextBox 11">
+            <a:extLst>
+              <a:ext uri="{FF2B5EF4-FFF2-40B4-BE49-F238E27FC236}">
+                <a16:creationId xmlns:a16="http://schemas.microsoft.com/office/drawing/2014/main" id="{55C76C78-93AD-3AB8-8DB3-C3F66ED4FE8E}"/>
+              </a:ext>
+            </a:extLst>
+          </p:cNvPr>
+          <p:cNvSpPr txBox="1"/>
+          <p:nvPr/>
+        </p:nvSpPr>
+        <p:spPr>
+          <a:xfrm>
+            <a:off x="6465103" y="1819917"/>
+            <a:ext cx="887767" cy="1862048"/>
+          </a:xfrm>
+          <a:prstGeom prst="rect">
+            <a:avLst/>
+          </a:prstGeom>
+          <a:noFill/>
+        </p:spPr>
+        <p:txBody>
+          <a:bodyPr wrap="square" rtlCol="0">
+            <a:spAutoFit/>
+          </a:bodyPr>
+          <a:lstStyle/>
+          <a:p>
+            <a:pPr algn="ctr"/>
+            <a:r>
+              <a:rPr lang="en-GB" sz="11500" b="1" dirty="0">
+                <a:solidFill>
+                  <a:schemeClr val="bg1"/>
+                </a:solidFill>
+              </a:rPr>
+              <a:t>4</a:t>
+            </a:r>
+          </a:p>
+        </p:txBody>
+      </p:sp>
+      <p:pic>
+        <p:nvPicPr>
+          <p:cNvPr id="13" name="Picture 12" descr="A screenshot of a video game&#10;&#10;AI-generated content may be incorrect.">
+            <a:extLst>
+              <a:ext uri="{FF2B5EF4-FFF2-40B4-BE49-F238E27FC236}">
+                <a16:creationId xmlns:a16="http://schemas.microsoft.com/office/drawing/2014/main" id="{C88F95C9-0B02-4D5B-DA39-6198AFAF7277}"/>
+              </a:ext>
+            </a:extLst>
+          </p:cNvPr>
+          <p:cNvPicPr>
+            <a:picLocks noChangeAspect="1"/>
+          </p:cNvPicPr>
+          <p:nvPr/>
+        </p:nvPicPr>
+        <p:blipFill>
+          <a:blip r:embed="rId2">
+            <a:duotone>
+              <a:schemeClr val="accent4">
+                <a:shade val="45000"/>
+                <a:satMod val="135000"/>
+              </a:schemeClr>
+              <a:prstClr val="white"/>
+            </a:duotone>
+            <a:extLst>
+              <a:ext uri="{BEBA8EAE-BF5A-486C-A8C5-ECC9F3942E4B}">
+                <a14:imgProps xmlns:a14="http://schemas.microsoft.com/office/drawing/2010/main">
+                  <a14:imgLayer r:embed="rId3">
+                    <a14:imgEffect>
+                      <a14:backgroundRemoval t="14041" b="81591" l="50644" r="82318">
+                        <a14:foregroundMark x1="54077" y1="14197" x2="54936" y2="47114"/>
+                        <a14:foregroundMark x1="54936" y1="69111" x2="53562" y2="77067"/>
+                        <a14:foregroundMark x1="53562" y1="77067" x2="53305" y2="77691"/>
+                        <a14:foregroundMark x1="51159" y1="78939" x2="57253" y2="78939"/>
+                        <a14:foregroundMark x1="50644" y1="73323" x2="53391" y2="60998"/>
+                        <a14:foregroundMark x1="57511" y1="74727" x2="55708" y2="58346"/>
+                        <a14:foregroundMark x1="57082" y1="80811" x2="57082" y2="80811"/>
+                        <a14:foregroundMark x1="52704" y1="80655" x2="52704" y2="80655"/>
+                        <a14:foregroundMark x1="52361" y1="79875" x2="53219" y2="79875"/>
+                        <a14:foregroundMark x1="52017" y1="81123" x2="52704" y2="81123"/>
+                        <a14:foregroundMark x1="54592" y1="79407" x2="57253" y2="79095"/>
+                        <a14:foregroundMark x1="52618" y1="56162" x2="52618" y2="56162"/>
+                        <a14:foregroundMark x1="56996" y1="56318" x2="56996" y2="56318"/>
+                        <a14:foregroundMark x1="57082" y1="53666" x2="57082" y2="53666"/>
+                        <a14:foregroundMark x1="52189" y1="53354" x2="52189" y2="53354"/>
+                        <a14:foregroundMark x1="54936" y1="53510" x2="54936" y2="56786"/>
+                        <a14:foregroundMark x1="52618" y1="57098" x2="54850" y2="57098"/>
+                        <a14:foregroundMark x1="56910" y1="56942" x2="56910" y2="56942"/>
+                        <a14:foregroundMark x1="55365" y1="57098" x2="55365" y2="57098"/>
+                        <a14:foregroundMark x1="52618" y1="52730" x2="51931" y2="44930"/>
+                        <a14:foregroundMark x1="51931" y1="44930" x2="55708" y2="37598"/>
+                        <a14:foregroundMark x1="55708" y1="37598" x2="58627" y2="42746"/>
+                        <a14:foregroundMark x1="58627" y1="42746" x2="58026" y2="51950"/>
+                        <a14:foregroundMark x1="58026" y1="51950" x2="52704" y2="50546"/>
+                        <a14:foregroundMark x1="52704" y1="50546" x2="51159" y2="42590"/>
+                        <a14:foregroundMark x1="51159" y1="42590" x2="55451" y2="42122"/>
+                        <a14:foregroundMark x1="55451" y1="42122" x2="53476" y2="48362"/>
+                        <a14:foregroundMark x1="50901" y1="58970" x2="50901" y2="64743"/>
+                        <a14:foregroundMark x1="51845" y1="29641" x2="52275" y2="21061"/>
+                        <a14:foregroundMark x1="52275" y1="21061" x2="55021" y2="15289"/>
+                        <a14:foregroundMark x1="55021" y1="15289" x2="57253" y2="22621"/>
+                        <a14:foregroundMark x1="57253" y1="22621" x2="57854" y2="30265"/>
+                        <a14:foregroundMark x1="57854" y1="30265" x2="55193" y2="24181"/>
+                        <a14:foregroundMark x1="58970" y1="28393" x2="58970" y2="28393"/>
+                        <a14:foregroundMark x1="58970" y1="28705" x2="58026" y2="26677"/>
+                        <a14:foregroundMark x1="58798" y1="30421" x2="57854" y2="24805"/>
+                        <a14:foregroundMark x1="58798" y1="26989" x2="57854" y2="24493"/>
+                        <a14:foregroundMark x1="51330" y1="34789" x2="51760" y2="30265"/>
+                        <a14:foregroundMark x1="50815" y1="30889" x2="50987" y2="30265"/>
+                        <a14:foregroundMark x1="50815" y1="29329" x2="51245" y2="28237"/>
+                        <a14:foregroundMark x1="50644" y1="27925" x2="51760" y2="25429"/>
+                        <a14:foregroundMark x1="51245" y1="22621" x2="51588" y2="20905"/>
+                        <a14:foregroundMark x1="54936" y1="14041" x2="54936" y2="18409"/>
+                        <a14:foregroundMark x1="55193" y1="21061" x2="53991" y2="31513"/>
+                        <a14:foregroundMark x1="53991" y1="31513" x2="56910" y2="28081"/>
+                        <a14:foregroundMark x1="52017" y1="32761" x2="56481" y2="33853"/>
+                        <a14:foregroundMark x1="56481" y1="33853" x2="52704" y2="31201"/>
+                        <a14:foregroundMark x1="52704" y1="31201" x2="56567" y2="33853"/>
+                        <a14:foregroundMark x1="56567" y1="33853" x2="52532" y2="53978"/>
+                        <a14:foregroundMark x1="52532" y1="53978" x2="52532" y2="53822"/>
+                        <a14:foregroundMark x1="51502" y1="60062" x2="55021" y2="63651"/>
+                        <a14:foregroundMark x1="55021" y1="63651" x2="53219" y2="72543"/>
+                        <a14:foregroundMark x1="53219" y1="72543" x2="51502" y2="59750"/>
+                        <a14:foregroundMark x1="51502" y1="59750" x2="52961" y2="72387"/>
+                        <a14:foregroundMark x1="54764" y1="80499" x2="54936" y2="81591"/>
+                        <a14:foregroundMark x1="50987" y1="77691" x2="56223" y2="77067"/>
+                        <a14:foregroundMark x1="56223" y1="77067" x2="58541" y2="69579"/>
+                        <a14:foregroundMark x1="58541" y1="69579" x2="58627" y2="63183"/>
+                        <a14:foregroundMark x1="50730" y1="73635" x2="51073" y2="59438"/>
+                        <a14:foregroundMark x1="57425" y1="31669" x2="58112" y2="35413"/>
+                        <a14:foregroundMark x1="58026" y1="22153" x2="58026" y2="21529"/>
+                        <a14:foregroundMark x1="57682" y1="22933" x2="58283" y2="27457"/>
+                        <a14:foregroundMark x1="52532" y1="18565" x2="51073" y2="21061"/>
+                        <a14:foregroundMark x1="57854" y1="20749" x2="57511" y2="20281"/>
+                        <a14:foregroundMark x1="56910" y1="19501" x2="58455" y2="23089"/>
+                        <a14:foregroundMark x1="55536" y1="28081" x2="57253" y2="53822"/>
+                        <a14:foregroundMark x1="57167" y1="56318" x2="57167" y2="56318"/>
+                        <a14:foregroundMark x1="56738" y1="56006" x2="57682" y2="58502"/>
+                        <a14:foregroundMark x1="56567" y1="56474" x2="57940" y2="64743"/>
+                        <a14:foregroundMark x1="54936" y1="80187" x2="54592" y2="81123"/>
+                      </a14:backgroundRemoval>
+                    </a14:imgEffect>
+                  </a14:imgLayer>
+                </a14:imgProps>
+              </a:ext>
+              <a:ext uri="{28A0092B-C50C-407E-A947-70E740481C1C}">
+                <a14:useLocalDpi xmlns:a14="http://schemas.microsoft.com/office/drawing/2010/main" val="0"/>
+              </a:ext>
+            </a:extLst>
+          </a:blip>
+          <a:srcRect l="50000" t="12209" r="40389" b="17185"/>
+          <a:stretch>
+            <a:fillRect/>
+          </a:stretch>
+        </p:blipFill>
+        <p:spPr>
+          <a:xfrm>
+            <a:off x="7796754" y="683580"/>
+            <a:ext cx="1137703" cy="4598633"/>
+          </a:xfrm>
+          <a:prstGeom prst="rect">
+            <a:avLst/>
+          </a:prstGeom>
+        </p:spPr>
+      </p:pic>
+      <p:sp>
+        <p:nvSpPr>
+          <p:cNvPr id="14" name="TextBox 13">
+            <a:extLst>
+              <a:ext uri="{FF2B5EF4-FFF2-40B4-BE49-F238E27FC236}">
+                <a16:creationId xmlns:a16="http://schemas.microsoft.com/office/drawing/2014/main" id="{C9B96F9D-A066-48E4-91A0-D78CD6A3D76C}"/>
+              </a:ext>
+            </a:extLst>
+          </p:cNvPr>
+          <p:cNvSpPr txBox="1"/>
+          <p:nvPr/>
+        </p:nvSpPr>
+        <p:spPr>
+          <a:xfrm>
+            <a:off x="7921721" y="1819917"/>
+            <a:ext cx="887767" cy="1862048"/>
+          </a:xfrm>
+          <a:prstGeom prst="rect">
+            <a:avLst/>
+          </a:prstGeom>
+          <a:noFill/>
+        </p:spPr>
+        <p:txBody>
+          <a:bodyPr wrap="square" rtlCol="0">
+            <a:spAutoFit/>
+          </a:bodyPr>
+          <a:lstStyle/>
+          <a:p>
+            <a:pPr algn="ctr"/>
+            <a:r>
+              <a:rPr lang="en-GB" sz="11500" b="1" dirty="0">
+                <a:solidFill>
+                  <a:schemeClr val="bg1"/>
+                </a:solidFill>
+              </a:rPr>
+              <a:t>5</a:t>
+            </a:r>
+          </a:p>
+        </p:txBody>
+      </p:sp>
+      <p:pic>
+        <p:nvPicPr>
+          <p:cNvPr id="15" name="Picture 14" descr="A screenshot of a video game&#10;&#10;AI-generated content may be incorrect.">
+            <a:extLst>
+              <a:ext uri="{FF2B5EF4-FFF2-40B4-BE49-F238E27FC236}">
+                <a16:creationId xmlns:a16="http://schemas.microsoft.com/office/drawing/2014/main" id="{F298BA2F-FA09-152A-BEFE-9095217F9601}"/>
+              </a:ext>
+            </a:extLst>
+          </p:cNvPr>
+          <p:cNvPicPr>
+            <a:picLocks noChangeAspect="1"/>
+          </p:cNvPicPr>
+          <p:nvPr/>
+        </p:nvPicPr>
+        <p:blipFill>
+          <a:blip r:embed="rId2">
+            <a:duotone>
+              <a:schemeClr val="accent5">
+                <a:shade val="45000"/>
+                <a:satMod val="135000"/>
+              </a:schemeClr>
+              <a:prstClr val="white"/>
+            </a:duotone>
+            <a:extLst>
+              <a:ext uri="{BEBA8EAE-BF5A-486C-A8C5-ECC9F3942E4B}">
+                <a14:imgProps xmlns:a14="http://schemas.microsoft.com/office/drawing/2010/main">
+                  <a14:imgLayer r:embed="rId3">
+                    <a14:imgEffect>
+                      <a14:backgroundRemoval t="14041" b="81591" l="50644" r="82318">
+                        <a14:foregroundMark x1="54077" y1="14197" x2="54936" y2="47114"/>
+                        <a14:foregroundMark x1="54936" y1="69111" x2="53562" y2="77067"/>
+                        <a14:foregroundMark x1="53562" y1="77067" x2="53305" y2="77691"/>
+                        <a14:foregroundMark x1="51159" y1="78939" x2="57253" y2="78939"/>
+                        <a14:foregroundMark x1="50644" y1="73323" x2="53391" y2="60998"/>
+                        <a14:foregroundMark x1="57511" y1="74727" x2="55708" y2="58346"/>
+                        <a14:foregroundMark x1="57082" y1="80811" x2="57082" y2="80811"/>
+                        <a14:foregroundMark x1="52704" y1="80655" x2="52704" y2="80655"/>
+                        <a14:foregroundMark x1="52361" y1="79875" x2="53219" y2="79875"/>
+                        <a14:foregroundMark x1="52017" y1="81123" x2="52704" y2="81123"/>
+                        <a14:foregroundMark x1="54592" y1="79407" x2="57253" y2="79095"/>
+                        <a14:foregroundMark x1="52618" y1="56162" x2="52618" y2="56162"/>
+                        <a14:foregroundMark x1="56996" y1="56318" x2="56996" y2="56318"/>
+                        <a14:foregroundMark x1="57082" y1="53666" x2="57082" y2="53666"/>
+                        <a14:foregroundMark x1="52189" y1="53354" x2="52189" y2="53354"/>
+                        <a14:foregroundMark x1="54936" y1="53510" x2="54936" y2="56786"/>
+                        <a14:foregroundMark x1="52618" y1="57098" x2="54850" y2="57098"/>
+                        <a14:foregroundMark x1="56910" y1="56942" x2="56910" y2="56942"/>
+                        <a14:foregroundMark x1="55365" y1="57098" x2="55365" y2="57098"/>
+                        <a14:foregroundMark x1="52618" y1="52730" x2="51931" y2="44930"/>
+                        <a14:foregroundMark x1="51931" y1="44930" x2="55708" y2="37598"/>
+                        <a14:foregroundMark x1="55708" y1="37598" x2="58627" y2="42746"/>
+                        <a14:foregroundMark x1="58627" y1="42746" x2="58026" y2="51950"/>
+                        <a14:foregroundMark x1="58026" y1="51950" x2="52704" y2="50546"/>
+                        <a14:foregroundMark x1="52704" y1="50546" x2="51159" y2="42590"/>
+                        <a14:foregroundMark x1="51159" y1="42590" x2="55451" y2="42122"/>
+                        <a14:foregroundMark x1="55451" y1="42122" x2="53476" y2="48362"/>
+                        <a14:foregroundMark x1="50901" y1="58970" x2="50901" y2="64743"/>
+                        <a14:foregroundMark x1="51845" y1="29641" x2="52275" y2="21061"/>
+                        <a14:foregroundMark x1="52275" y1="21061" x2="55021" y2="15289"/>
+                        <a14:foregroundMark x1="55021" y1="15289" x2="57253" y2="22621"/>
+                        <a14:foregroundMark x1="57253" y1="22621" x2="57854" y2="30265"/>
+                        <a14:foregroundMark x1="57854" y1="30265" x2="55193" y2="24181"/>
+                        <a14:foregroundMark x1="58970" y1="28393" x2="58970" y2="28393"/>
+                        <a14:foregroundMark x1="58970" y1="28705" x2="58026" y2="26677"/>
+                        <a14:foregroundMark x1="58798" y1="30421" x2="57854" y2="24805"/>
+                        <a14:foregroundMark x1="58798" y1="26989" x2="57854" y2="24493"/>
+                        <a14:foregroundMark x1="51330" y1="34789" x2="51760" y2="30265"/>
+                        <a14:foregroundMark x1="50815" y1="30889" x2="50987" y2="30265"/>
+                        <a14:foregroundMark x1="50815" y1="29329" x2="51245" y2="28237"/>
+                        <a14:foregroundMark x1="50644" y1="27925" x2="51760" y2="25429"/>
+                        <a14:foregroundMark x1="51245" y1="22621" x2="51588" y2="20905"/>
+                        <a14:foregroundMark x1="54936" y1="14041" x2="54936" y2="18409"/>
+                        <a14:foregroundMark x1="55193" y1="21061" x2="53991" y2="31513"/>
+                        <a14:foregroundMark x1="53991" y1="31513" x2="56910" y2="28081"/>
+                        <a14:foregroundMark x1="52017" y1="32761" x2="56481" y2="33853"/>
+                        <a14:foregroundMark x1="56481" y1="33853" x2="52704" y2="31201"/>
+                        <a14:foregroundMark x1="52704" y1="31201" x2="56567" y2="33853"/>
+                        <a14:foregroundMark x1="56567" y1="33853" x2="52532" y2="53978"/>
+                        <a14:foregroundMark x1="52532" y1="53978" x2="52532" y2="53822"/>
+                        <a14:foregroundMark x1="51502" y1="60062" x2="55021" y2="63651"/>
+                        <a14:foregroundMark x1="55021" y1="63651" x2="53219" y2="72543"/>
+                        <a14:foregroundMark x1="53219" y1="72543" x2="51502" y2="59750"/>
+                        <a14:foregroundMark x1="51502" y1="59750" x2="52961" y2="72387"/>
+                        <a14:foregroundMark x1="54764" y1="80499" x2="54936" y2="81591"/>
+                        <a14:foregroundMark x1="50987" y1="77691" x2="56223" y2="77067"/>
+                        <a14:foregroundMark x1="56223" y1="77067" x2="58541" y2="69579"/>
+                        <a14:foregroundMark x1="58541" y1="69579" x2="58627" y2="63183"/>
+                        <a14:foregroundMark x1="50730" y1="73635" x2="51073" y2="59438"/>
+                        <a14:foregroundMark x1="57425" y1="31669" x2="58112" y2="35413"/>
+                        <a14:foregroundMark x1="58026" y1="22153" x2="58026" y2="21529"/>
+                        <a14:foregroundMark x1="57682" y1="22933" x2="58283" y2="27457"/>
+                        <a14:foregroundMark x1="52532" y1="18565" x2="51073" y2="21061"/>
+                        <a14:foregroundMark x1="57854" y1="20749" x2="57511" y2="20281"/>
+                        <a14:foregroundMark x1="56910" y1="19501" x2="58455" y2="23089"/>
+                        <a14:foregroundMark x1="55536" y1="28081" x2="57253" y2="53822"/>
+                        <a14:foregroundMark x1="57167" y1="56318" x2="57167" y2="56318"/>
+                        <a14:foregroundMark x1="56738" y1="56006" x2="57682" y2="58502"/>
+                        <a14:foregroundMark x1="56567" y1="56474" x2="57940" y2="64743"/>
+                        <a14:foregroundMark x1="54936" y1="80187" x2="54592" y2="81123"/>
+                      </a14:backgroundRemoval>
+                    </a14:imgEffect>
+                  </a14:imgLayer>
+                </a14:imgProps>
+              </a:ext>
+              <a:ext uri="{28A0092B-C50C-407E-A947-70E740481C1C}">
+                <a14:useLocalDpi xmlns:a14="http://schemas.microsoft.com/office/drawing/2010/main" val="0"/>
+              </a:ext>
+            </a:extLst>
+          </a:blip>
+          <a:srcRect l="50000" t="12209" r="40389" b="17185"/>
+          <a:stretch>
+            <a:fillRect/>
+          </a:stretch>
+        </p:blipFill>
+        <p:spPr>
+          <a:xfrm>
+            <a:off x="9289682" y="683580"/>
+            <a:ext cx="1137703" cy="4598633"/>
+          </a:xfrm>
+          <a:prstGeom prst="rect">
+            <a:avLst/>
+          </a:prstGeom>
+        </p:spPr>
+      </p:pic>
+      <p:sp>
+        <p:nvSpPr>
+          <p:cNvPr id="16" name="TextBox 15">
+            <a:extLst>
+              <a:ext uri="{FF2B5EF4-FFF2-40B4-BE49-F238E27FC236}">
+                <a16:creationId xmlns:a16="http://schemas.microsoft.com/office/drawing/2014/main" id="{31B29D36-5C98-3C88-0845-4CEB2C6B1089}"/>
+              </a:ext>
+            </a:extLst>
+          </p:cNvPr>
+          <p:cNvSpPr txBox="1"/>
+          <p:nvPr/>
+        </p:nvSpPr>
+        <p:spPr>
+          <a:xfrm>
+            <a:off x="9414649" y="1819917"/>
+            <a:ext cx="887767" cy="1862048"/>
+          </a:xfrm>
+          <a:prstGeom prst="rect">
+            <a:avLst/>
+          </a:prstGeom>
+          <a:noFill/>
+        </p:spPr>
+        <p:txBody>
+          <a:bodyPr wrap="square" rtlCol="0">
+            <a:spAutoFit/>
+          </a:bodyPr>
+          <a:lstStyle/>
+          <a:p>
+            <a:pPr algn="ctr"/>
+            <a:r>
+              <a:rPr lang="en-GB" sz="11500" b="1" dirty="0">
+                <a:solidFill>
+                  <a:schemeClr val="bg1"/>
+                </a:solidFill>
+              </a:rPr>
+              <a:t>6</a:t>
+            </a:r>
+          </a:p>
+        </p:txBody>
+      </p:sp>
+    </p:spTree>
+    <p:extLst>
+      <p:ext uri="{BB962C8B-B14F-4D97-AF65-F5344CB8AC3E}">
+        <p14:creationId xmlns:p14="http://schemas.microsoft.com/office/powerpoint/2010/main" val="2657057933"/>
+      </p:ext>
+    </p:extLst>
+  </p:cSld>
+  <p:clrMapOvr>
+    <a:masterClrMapping/>
+  </p:clrMapOvr>
+</p:sld>
+</file>
+
 <file path=ppt/theme/theme1.xml><?xml version="1.0" encoding="utf-8"?>
 <a:theme xmlns:a="http://schemas.openxmlformats.org/drawingml/2006/main" name="Office Theme">
   <a:themeElements>

</xml_diff>